<commit_message>
Add link in power point
</commit_message>
<xml_diff>
--- a/InternetAndApplications.pptx
+++ b/InternetAndApplications.pptx
@@ -6794,17 +6794,12 @@
             </a:r>
             <a:r>
               <a:rPr lang="en-US" dirty="0" smtClean="0"/>
-              <a:t> </a:t>
-            </a:r>
-            <a:r>
-              <a:rPr lang="en-US" smtClean="0"/>
-              <a:t>(Ubuntu)</a:t>
-            </a:r>
-            <a:r>
-              <a:rPr lang="el-GR" smtClean="0"/>
+              <a:t> (Ubuntu)</a:t>
+            </a:r>
+            <a:r>
+              <a:rPr lang="el-GR" dirty="0" smtClean="0"/>
               <a:t>:</a:t>
             </a:r>
-            <a:endParaRPr lang="el-GR" dirty="0" smtClean="0"/>
           </a:p>
           <a:p>
             <a:pPr lvl="1"/>
@@ -6880,7 +6875,15 @@
             <a:pPr lvl="2"/>
             <a:r>
               <a:rPr lang="en-US" dirty="0" smtClean="0"/>
-              <a:t>sudo install –g serve</a:t>
+              <a:t>sudo </a:t>
+            </a:r>
+            <a:r>
+              <a:rPr lang="en-US" dirty="0" smtClean="0"/>
+              <a:t>npm install </a:t>
+            </a:r>
+            <a:r>
+              <a:rPr lang="en-US" dirty="0" smtClean="0"/>
+              <a:t>–g serve</a:t>
             </a:r>
           </a:p>
           <a:p>
@@ -6981,13 +6984,37 @@
               <a:t>της εφαρμογής καθώς και ανάλυση του κώδικα υπάρχει στο </a:t>
             </a:r>
             <a:r>
-              <a:rPr lang="en-US" dirty="0" smtClean="0"/>
+              <a:rPr lang="en-US" smtClean="0"/>
               <a:t>YouTube</a:t>
             </a:r>
             <a:r>
-              <a:rPr lang="en-US" dirty="0"/>
-              <a:t>.</a:t>
-            </a:r>
+              <a:rPr lang="en-US" smtClean="0"/>
+              <a:t>: </a:t>
+            </a:r>
+            <a:r>
+              <a:rPr lang="en-US" smtClean="0">
+                <a:hlinkClick r:id="rId2"/>
+              </a:rPr>
+              <a:t>https</a:t>
+            </a:r>
+            <a:r>
+              <a:rPr lang="en-US" dirty="0">
+                <a:hlinkClick r:id="rId2"/>
+              </a:rPr>
+              <a:t>://</a:t>
+            </a:r>
+            <a:r>
+              <a:rPr lang="en-US" dirty="0" smtClean="0">
+                <a:hlinkClick r:id="rId2"/>
+              </a:rPr>
+              <a:t>www.youtube.com/watch?v=r6Wvneym12Q</a:t>
+            </a:r>
+            <a:endParaRPr lang="en-US" dirty="0" smtClean="0"/>
+          </a:p>
+          <a:p>
+            <a:pPr marL="0" indent="0">
+              <a:buNone/>
+            </a:pPr>
             <a:endParaRPr lang="en-US" dirty="0" smtClean="0"/>
           </a:p>
           <a:p>

</xml_diff>